<commit_message>
fix + display chronograms
</commit_message>
<xml_diff>
--- a/PlatformDeveloperGuide/images/uiLL.pptx
+++ b/PlatformDeveloperGuide/images/uiLL.pptx
@@ -202,7 +202,7 @@
           <a:p>
             <a:fld id="{F47202D6-4449-4ABC-9430-570B72DCED4F}" type="datetimeFigureOut">
               <a:rPr lang="en-US" smtClean="0"/>
-              <a:t>03-Aug-20</a:t>
+              <a:t>04-Aug-20</a:t>
             </a:fld>
             <a:endParaRPr lang="en-US"/>
           </a:p>
@@ -702,7 +702,7 @@
           <a:p>
             <a:fld id="{4E285625-C24A-4341-90BC-6CD71F835625}" type="datetimeFigureOut">
               <a:rPr lang="en-GB" smtClean="0"/>
-              <a:t>03/08/2020</a:t>
+              <a:t>04/08/2020</a:t>
             </a:fld>
             <a:endParaRPr lang="en-GB"/>
           </a:p>
@@ -902,7 +902,7 @@
           <a:p>
             <a:fld id="{4E285625-C24A-4341-90BC-6CD71F835625}" type="datetimeFigureOut">
               <a:rPr lang="en-GB" smtClean="0"/>
-              <a:t>03/08/2020</a:t>
+              <a:t>04/08/2020</a:t>
             </a:fld>
             <a:endParaRPr lang="en-GB"/>
           </a:p>
@@ -1112,7 +1112,7 @@
           <a:p>
             <a:fld id="{4E285625-C24A-4341-90BC-6CD71F835625}" type="datetimeFigureOut">
               <a:rPr lang="en-GB" smtClean="0"/>
-              <a:t>03/08/2020</a:t>
+              <a:t>04/08/2020</a:t>
             </a:fld>
             <a:endParaRPr lang="en-GB"/>
           </a:p>
@@ -1312,7 +1312,7 @@
           <a:p>
             <a:fld id="{4E285625-C24A-4341-90BC-6CD71F835625}" type="datetimeFigureOut">
               <a:rPr lang="en-GB" smtClean="0"/>
-              <a:t>03/08/2020</a:t>
+              <a:t>04/08/2020</a:t>
             </a:fld>
             <a:endParaRPr lang="en-GB"/>
           </a:p>
@@ -1588,7 +1588,7 @@
           <a:p>
             <a:fld id="{4E285625-C24A-4341-90BC-6CD71F835625}" type="datetimeFigureOut">
               <a:rPr lang="en-GB" smtClean="0"/>
-              <a:t>03/08/2020</a:t>
+              <a:t>04/08/2020</a:t>
             </a:fld>
             <a:endParaRPr lang="en-GB"/>
           </a:p>
@@ -1856,7 +1856,7 @@
           <a:p>
             <a:fld id="{4E285625-C24A-4341-90BC-6CD71F835625}" type="datetimeFigureOut">
               <a:rPr lang="en-GB" smtClean="0"/>
-              <a:t>03/08/2020</a:t>
+              <a:t>04/08/2020</a:t>
             </a:fld>
             <a:endParaRPr lang="en-GB"/>
           </a:p>
@@ -2271,7 +2271,7 @@
           <a:p>
             <a:fld id="{4E285625-C24A-4341-90BC-6CD71F835625}" type="datetimeFigureOut">
               <a:rPr lang="en-GB" smtClean="0"/>
-              <a:t>03/08/2020</a:t>
+              <a:t>04/08/2020</a:t>
             </a:fld>
             <a:endParaRPr lang="en-GB"/>
           </a:p>
@@ -2413,7 +2413,7 @@
           <a:p>
             <a:fld id="{4E285625-C24A-4341-90BC-6CD71F835625}" type="datetimeFigureOut">
               <a:rPr lang="en-GB" smtClean="0"/>
-              <a:t>03/08/2020</a:t>
+              <a:t>04/08/2020</a:t>
             </a:fld>
             <a:endParaRPr lang="en-GB"/>
           </a:p>
@@ -2526,7 +2526,7 @@
           <a:p>
             <a:fld id="{4E285625-C24A-4341-90BC-6CD71F835625}" type="datetimeFigureOut">
               <a:rPr lang="en-GB" smtClean="0"/>
-              <a:t>03/08/2020</a:t>
+              <a:t>04/08/2020</a:t>
             </a:fld>
             <a:endParaRPr lang="en-GB"/>
           </a:p>
@@ -2839,7 +2839,7 @@
           <a:p>
             <a:fld id="{4E285625-C24A-4341-90BC-6CD71F835625}" type="datetimeFigureOut">
               <a:rPr lang="en-GB" smtClean="0"/>
-              <a:t>03/08/2020</a:t>
+              <a:t>04/08/2020</a:t>
             </a:fld>
             <a:endParaRPr lang="en-GB"/>
           </a:p>
@@ -3128,7 +3128,7 @@
           <a:p>
             <a:fld id="{4E285625-C24A-4341-90BC-6CD71F835625}" type="datetimeFigureOut">
               <a:rPr lang="en-GB" smtClean="0"/>
-              <a:t>03/08/2020</a:t>
+              <a:t>04/08/2020</a:t>
             </a:fld>
             <a:endParaRPr lang="en-GB"/>
           </a:p>
@@ -3371,7 +3371,7 @@
           <a:p>
             <a:fld id="{4E285625-C24A-4341-90BC-6CD71F835625}" type="datetimeFigureOut">
               <a:rPr lang="en-GB" smtClean="0"/>
-              <a:t>03/08/2020</a:t>
+              <a:t>04/08/2020</a:t>
             </a:fld>
             <a:endParaRPr lang="en-GB"/>
           </a:p>
@@ -3802,7 +3802,7 @@
         </p:nvSpPr>
         <p:spPr>
           <a:xfrm>
-            <a:off x="6181071" y="3470234"/>
+            <a:off x="6194720" y="3896742"/>
             <a:ext cx="5802369" cy="524072"/>
           </a:xfrm>
           <a:prstGeom prst="roundRect">
@@ -3864,7 +3864,7 @@
         </p:nvSpPr>
         <p:spPr>
           <a:xfrm>
-            <a:off x="281584" y="3470234"/>
+            <a:off x="295233" y="3896742"/>
             <a:ext cx="3859729" cy="524072"/>
           </a:xfrm>
           <a:prstGeom prst="roundRect">
@@ -3926,8 +3926,8 @@
         </p:nvSpPr>
         <p:spPr>
           <a:xfrm>
-            <a:off x="321535" y="1282851"/>
-            <a:ext cx="11719072" cy="1846982"/>
+            <a:off x="321535" y="1282850"/>
+            <a:ext cx="11719072" cy="2158725"/>
           </a:xfrm>
           <a:prstGeom prst="roundRect">
             <a:avLst>
@@ -4174,14 +4174,14 @@
             <a:r>
               <a:rPr lang="en-US" sz="1200" dirty="0" err="1">
                 <a:solidFill>
-                  <a:schemeClr val="tx2"/>
+                  <a:schemeClr val="bg1"/>
                 </a:solidFill>
               </a:rPr>
               <a:t>LLUI_DISPLAY_impl.h</a:t>
             </a:r>
             <a:endParaRPr lang="en-US" sz="1200" dirty="0">
               <a:solidFill>
-                <a:schemeClr val="tx2"/>
+                <a:schemeClr val="bg1"/>
               </a:solidFill>
             </a:endParaRPr>
           </a:p>
@@ -4487,14 +4487,14 @@
             <a:r>
               <a:rPr lang="en-US" sz="1200" dirty="0" err="1">
                 <a:solidFill>
-                  <a:schemeClr val="tx2"/>
+                  <a:schemeClr val="bg1"/>
                 </a:solidFill>
               </a:rPr>
               <a:t>LLUI_PAINTER_impl.h</a:t>
             </a:r>
             <a:endParaRPr lang="en-US" sz="1200" dirty="0">
               <a:solidFill>
-                <a:schemeClr val="tx2"/>
+                <a:schemeClr val="bg1"/>
               </a:solidFill>
             </a:endParaRPr>
           </a:p>
@@ -4645,14 +4645,14 @@
             <a:r>
               <a:rPr lang="en-US" sz="1200" dirty="0" err="1">
                 <a:solidFill>
-                  <a:schemeClr val="tx2"/>
+                  <a:schemeClr val="bg1"/>
                 </a:solidFill>
               </a:rPr>
               <a:t>ui_drawing.h</a:t>
             </a:r>
             <a:endParaRPr lang="en-US" sz="1200" dirty="0">
               <a:solidFill>
-                <a:schemeClr val="tx2"/>
+                <a:schemeClr val="bg1"/>
               </a:solidFill>
             </a:endParaRPr>
           </a:p>
@@ -4801,16 +4801,16 @@
           <a:p>
             <a:pPr algn="ctr"/>
             <a:r>
-              <a:rPr lang="en-US" sz="1050" dirty="0" err="1">
-                <a:solidFill>
-                  <a:schemeClr val="tx2"/>
+              <a:rPr lang="en-US" sz="1100" dirty="0" err="1">
+                <a:solidFill>
+                  <a:schemeClr val="bg1"/>
                 </a:solidFill>
               </a:rPr>
               <a:t>ui_drawing_soft.h</a:t>
             </a:r>
-            <a:endParaRPr lang="en-US" sz="1050" dirty="0">
+            <a:endParaRPr lang="en-US" sz="1100" dirty="0">
               <a:solidFill>
-                <a:schemeClr val="tx2"/>
+                <a:schemeClr val="bg1"/>
               </a:solidFill>
             </a:endParaRPr>
           </a:p>
@@ -4830,7 +4830,7 @@
         </p:nvSpPr>
         <p:spPr>
           <a:xfrm>
-            <a:off x="281584" y="3205278"/>
+            <a:off x="295233" y="3631786"/>
             <a:ext cx="3328283" cy="276999"/>
           </a:xfrm>
           <a:prstGeom prst="rect">
@@ -4870,7 +4870,7 @@
         </p:nvSpPr>
         <p:spPr>
           <a:xfrm>
-            <a:off x="479375" y="3603233"/>
+            <a:off x="493024" y="4029741"/>
             <a:ext cx="1645920" cy="288000"/>
           </a:xfrm>
           <a:prstGeom prst="roundRect">
@@ -5001,14 +5001,14 @@
             <a:r>
               <a:rPr lang="en-US" sz="1200" dirty="0" err="1">
                 <a:solidFill>
-                  <a:schemeClr val="tx2"/>
+                  <a:schemeClr val="bg1"/>
                 </a:solidFill>
               </a:rPr>
               <a:t>LLUI_PAINTER_impl.c</a:t>
             </a:r>
             <a:endParaRPr lang="en-US" sz="1200" dirty="0">
               <a:solidFill>
-                <a:schemeClr val="tx2"/>
+                <a:schemeClr val="bg1"/>
               </a:solidFill>
             </a:endParaRPr>
           </a:p>
@@ -5159,14 +5159,14 @@
             <a:r>
               <a:rPr lang="en-US" sz="1200" dirty="0" err="1">
                 <a:solidFill>
-                  <a:schemeClr val="tx2"/>
+                  <a:schemeClr val="bg1"/>
                 </a:solidFill>
               </a:rPr>
               <a:t>LLUI_DISPLAY.h</a:t>
             </a:r>
             <a:endParaRPr lang="en-US" sz="1200" dirty="0">
               <a:solidFill>
-                <a:schemeClr val="tx2"/>
+                <a:schemeClr val="bg1"/>
               </a:solidFill>
             </a:endParaRPr>
           </a:p>
@@ -5317,14 +5317,14 @@
             <a:r>
               <a:rPr lang="en-US" sz="1200" dirty="0" err="1">
                 <a:solidFill>
-                  <a:schemeClr val="tx2"/>
+                  <a:schemeClr val="bg1"/>
                 </a:solidFill>
               </a:rPr>
               <a:t>LLUI_INPUT_impl.h</a:t>
             </a:r>
             <a:endParaRPr lang="en-US" sz="1200" dirty="0">
               <a:solidFill>
-                <a:schemeClr val="tx2"/>
+                <a:schemeClr val="bg1"/>
               </a:solidFill>
             </a:endParaRPr>
           </a:p>
@@ -5475,14 +5475,14 @@
             <a:r>
               <a:rPr lang="en-US" sz="1200" dirty="0" err="1">
                 <a:solidFill>
-                  <a:schemeClr val="tx2"/>
+                  <a:schemeClr val="bg1"/>
                 </a:solidFill>
               </a:rPr>
               <a:t>LLUI_INPUT.h</a:t>
             </a:r>
             <a:endParaRPr lang="en-US" sz="1200" dirty="0">
               <a:solidFill>
-                <a:schemeClr val="tx2"/>
+                <a:schemeClr val="bg1"/>
               </a:solidFill>
             </a:endParaRPr>
           </a:p>
@@ -5633,14 +5633,14 @@
             <a:r>
               <a:rPr lang="en-US" sz="1200" dirty="0" err="1">
                 <a:solidFill>
-                  <a:schemeClr val="tx2"/>
+                  <a:schemeClr val="bg1"/>
                 </a:solidFill>
               </a:rPr>
               <a:t>LLUI_LED_impl.h</a:t>
             </a:r>
             <a:endParaRPr lang="en-US" sz="1200" dirty="0">
               <a:solidFill>
-                <a:schemeClr val="tx2"/>
+                <a:schemeClr val="bg1"/>
               </a:solidFill>
             </a:endParaRPr>
           </a:p>
@@ -5660,7 +5660,7 @@
         </p:nvSpPr>
         <p:spPr>
           <a:xfrm>
-            <a:off x="2241700" y="3607633"/>
+            <a:off x="2255349" y="4034141"/>
             <a:ext cx="1645920" cy="288000"/>
           </a:xfrm>
           <a:prstGeom prst="roundRect">
@@ -5791,14 +5791,14 @@
             <a:r>
               <a:rPr lang="en-US" sz="1200" dirty="0" err="1">
                 <a:solidFill>
-                  <a:schemeClr val="tx2"/>
+                  <a:schemeClr val="bg1"/>
                 </a:solidFill>
               </a:rPr>
               <a:t>LLDW_PAINTER_impl.c</a:t>
             </a:r>
             <a:endParaRPr lang="en-US" sz="1200" dirty="0">
               <a:solidFill>
-                <a:schemeClr val="tx2"/>
+                <a:schemeClr val="bg1"/>
               </a:solidFill>
             </a:endParaRPr>
           </a:p>
@@ -6104,14 +6104,14 @@
             <a:r>
               <a:rPr lang="en-US" sz="1200" dirty="0" err="1">
                 <a:solidFill>
-                  <a:schemeClr val="tx2"/>
+                  <a:schemeClr val="bg1"/>
                 </a:solidFill>
               </a:rPr>
               <a:t>LLDW_PAINTER_impl.h</a:t>
             </a:r>
             <a:endParaRPr lang="en-US" sz="1200" dirty="0">
               <a:solidFill>
-                <a:schemeClr val="tx2"/>
+                <a:schemeClr val="bg1"/>
               </a:solidFill>
             </a:endParaRPr>
           </a:p>
@@ -6186,7 +6186,7 @@
         </p:nvSpPr>
         <p:spPr>
           <a:xfrm>
-            <a:off x="6181071" y="3216969"/>
+            <a:off x="6194720" y="3643477"/>
             <a:ext cx="413896" cy="276999"/>
           </a:xfrm>
           <a:prstGeom prst="rect">
@@ -6221,7 +6221,7 @@
         </p:nvSpPr>
         <p:spPr>
           <a:xfrm>
-            <a:off x="6297476" y="3588270"/>
+            <a:off x="6311125" y="4014778"/>
             <a:ext cx="1645920" cy="288000"/>
           </a:xfrm>
           <a:prstGeom prst="roundRect">
@@ -6352,14 +6352,14 @@
             <a:r>
               <a:rPr lang="en-US" sz="1200" dirty="0" err="1">
                 <a:solidFill>
-                  <a:schemeClr val="tx2"/>
+                  <a:schemeClr val="bg1"/>
                 </a:solidFill>
               </a:rPr>
               <a:t>LLUI_INPUT_impl.c</a:t>
             </a:r>
             <a:endParaRPr lang="en-US" sz="1200" dirty="0">
               <a:solidFill>
-                <a:schemeClr val="tx2"/>
+                <a:schemeClr val="bg1"/>
               </a:solidFill>
             </a:endParaRPr>
           </a:p>
@@ -6379,7 +6379,7 @@
         </p:nvSpPr>
         <p:spPr>
           <a:xfrm>
-            <a:off x="8196963" y="3588270"/>
+            <a:off x="8210612" y="4014778"/>
             <a:ext cx="1645920" cy="288000"/>
           </a:xfrm>
           <a:prstGeom prst="roundRect">
@@ -6510,14 +6510,14 @@
             <a:r>
               <a:rPr lang="en-US" sz="1200" dirty="0" err="1">
                 <a:solidFill>
-                  <a:schemeClr val="tx2"/>
+                  <a:schemeClr val="bg1"/>
                 </a:solidFill>
               </a:rPr>
               <a:t>LLUI_DISPLAY_impl.c</a:t>
             </a:r>
             <a:endParaRPr lang="en-US" sz="1200" dirty="0">
               <a:solidFill>
-                <a:schemeClr val="tx2"/>
+                <a:schemeClr val="bg1"/>
               </a:solidFill>
             </a:endParaRPr>
           </a:p>
@@ -6537,7 +6537,7 @@
         </p:nvSpPr>
         <p:spPr>
           <a:xfrm>
-            <a:off x="10084640" y="3588270"/>
+            <a:off x="10098289" y="4014778"/>
             <a:ext cx="1645920" cy="288000"/>
           </a:xfrm>
           <a:prstGeom prst="roundRect">
@@ -6668,14 +6668,14 @@
             <a:r>
               <a:rPr lang="en-US" sz="1200" dirty="0" err="1">
                 <a:solidFill>
-                  <a:schemeClr val="tx2"/>
+                  <a:schemeClr val="bg1"/>
                 </a:solidFill>
               </a:rPr>
               <a:t>LLUI_LED_impl.c</a:t>
             </a:r>
             <a:endParaRPr lang="en-US" sz="1200" dirty="0">
               <a:solidFill>
-                <a:schemeClr val="tx2"/>
+                <a:schemeClr val="bg1"/>
               </a:solidFill>
             </a:endParaRPr>
           </a:p>
@@ -6826,14 +6826,14 @@
             <a:r>
               <a:rPr lang="en-US" sz="1200" dirty="0" err="1">
                 <a:solidFill>
-                  <a:schemeClr val="tx2"/>
+                  <a:schemeClr val="bg1"/>
                 </a:solidFill>
               </a:rPr>
               <a:t>dw_drawing.h</a:t>
             </a:r>
             <a:endParaRPr lang="en-US" sz="1200" dirty="0">
               <a:solidFill>
-                <a:schemeClr val="tx2"/>
+                <a:schemeClr val="bg1"/>
               </a:solidFill>
             </a:endParaRPr>
           </a:p>
@@ -6984,14 +6984,14 @@
             <a:r>
               <a:rPr lang="en-US" sz="1050" dirty="0" err="1">
                 <a:solidFill>
-                  <a:schemeClr val="tx2"/>
+                  <a:schemeClr val="bg1"/>
                 </a:solidFill>
               </a:rPr>
               <a:t>dw_drawing_soft.h</a:t>
             </a:r>
             <a:endParaRPr lang="en-US" sz="1050" dirty="0">
               <a:solidFill>
-                <a:schemeClr val="tx2"/>
+                <a:schemeClr val="bg1"/>
               </a:solidFill>
             </a:endParaRPr>
           </a:p>
@@ -7066,7 +7066,7 @@
         </p:nvGrpSpPr>
         <p:grpSpPr>
           <a:xfrm>
-            <a:off x="321535" y="4196207"/>
+            <a:off x="335184" y="4622715"/>
             <a:ext cx="1809751" cy="276999"/>
             <a:chOff x="1181100" y="4410075"/>
             <a:chExt cx="1809751" cy="276999"/>
@@ -7173,7 +7173,7 @@
         </p:nvGrpSpPr>
         <p:grpSpPr>
           <a:xfrm>
-            <a:off x="321535" y="4473206"/>
+            <a:off x="335184" y="4899714"/>
             <a:ext cx="1809751" cy="276999"/>
             <a:chOff x="1181100" y="4410075"/>
             <a:chExt cx="1809751" cy="276999"/>
@@ -7278,7 +7278,7 @@
         </p:nvGrpSpPr>
         <p:grpSpPr>
           <a:xfrm>
-            <a:off x="321535" y="4754193"/>
+            <a:off x="335184" y="5180701"/>
             <a:ext cx="1809751" cy="276999"/>
             <a:chOff x="1181100" y="4410075"/>
             <a:chExt cx="1809751" cy="276999"/>
@@ -7369,6 +7369,164 @@
           </p:txBody>
         </p:sp>
       </p:grpSp>
+      <p:sp>
+        <p:nvSpPr>
+          <p:cNvPr id="2" name="Rounded Rectangle 28">
+            <a:extLst>
+              <a:ext uri="{FF2B5EF4-FFF2-40B4-BE49-F238E27FC236}">
+                <a16:creationId xmlns:a16="http://schemas.microsoft.com/office/drawing/2014/main" id="{DADA767A-8DAE-4675-904B-EBB105FAF3D4}"/>
+              </a:ext>
+            </a:extLst>
+          </p:cNvPr>
+          <p:cNvSpPr/>
+          <p:nvPr/>
+        </p:nvSpPr>
+        <p:spPr>
+          <a:xfrm>
+            <a:off x="6719499" y="2991158"/>
+            <a:ext cx="1645920" cy="288000"/>
+          </a:xfrm>
+          <a:prstGeom prst="roundRect">
+            <a:avLst/>
+          </a:prstGeom>
+          <a:solidFill>
+            <a:srgbClr val="00AEC7"/>
+          </a:solidFill>
+          <a:ln>
+            <a:noFill/>
+          </a:ln>
+        </p:spPr>
+        <p:style>
+          <a:lnRef idx="2">
+            <a:schemeClr val="accent1">
+              <a:shade val="50000"/>
+            </a:schemeClr>
+          </a:lnRef>
+          <a:fillRef idx="1">
+            <a:schemeClr val="accent1"/>
+          </a:fillRef>
+          <a:effectRef idx="0">
+            <a:schemeClr val="accent1"/>
+          </a:effectRef>
+          <a:fontRef idx="minor">
+            <a:schemeClr val="lt1"/>
+          </a:fontRef>
+        </p:style>
+        <p:txBody>
+          <a:bodyPr rtlCol="0" anchor="ctr"/>
+          <a:lstStyle>
+            <a:defPPr>
+              <a:defRPr lang="en-US"/>
+            </a:defPPr>
+            <a:lvl1pPr marL="0" algn="l" defTabSz="914377" rtl="0" eaLnBrk="1" latinLnBrk="0" hangingPunct="1">
+              <a:defRPr sz="1800" kern="1200">
+                <a:solidFill>
+                  <a:schemeClr val="lt1"/>
+                </a:solidFill>
+                <a:latin typeface="+mn-lt"/>
+                <a:ea typeface="+mn-ea"/>
+                <a:cs typeface="+mn-cs"/>
+              </a:defRPr>
+            </a:lvl1pPr>
+            <a:lvl2pPr marL="457189" algn="l" defTabSz="914377" rtl="0" eaLnBrk="1" latinLnBrk="0" hangingPunct="1">
+              <a:defRPr sz="1800" kern="1200">
+                <a:solidFill>
+                  <a:schemeClr val="lt1"/>
+                </a:solidFill>
+                <a:latin typeface="+mn-lt"/>
+                <a:ea typeface="+mn-ea"/>
+                <a:cs typeface="+mn-cs"/>
+              </a:defRPr>
+            </a:lvl2pPr>
+            <a:lvl3pPr marL="914377" algn="l" defTabSz="914377" rtl="0" eaLnBrk="1" latinLnBrk="0" hangingPunct="1">
+              <a:defRPr sz="1800" kern="1200">
+                <a:solidFill>
+                  <a:schemeClr val="lt1"/>
+                </a:solidFill>
+                <a:latin typeface="+mn-lt"/>
+                <a:ea typeface="+mn-ea"/>
+                <a:cs typeface="+mn-cs"/>
+              </a:defRPr>
+            </a:lvl3pPr>
+            <a:lvl4pPr marL="1371566" algn="l" defTabSz="914377" rtl="0" eaLnBrk="1" latinLnBrk="0" hangingPunct="1">
+              <a:defRPr sz="1800" kern="1200">
+                <a:solidFill>
+                  <a:schemeClr val="lt1"/>
+                </a:solidFill>
+                <a:latin typeface="+mn-lt"/>
+                <a:ea typeface="+mn-ea"/>
+                <a:cs typeface="+mn-cs"/>
+              </a:defRPr>
+            </a:lvl4pPr>
+            <a:lvl5pPr marL="1828754" algn="l" defTabSz="914377" rtl="0" eaLnBrk="1" latinLnBrk="0" hangingPunct="1">
+              <a:defRPr sz="1800" kern="1200">
+                <a:solidFill>
+                  <a:schemeClr val="lt1"/>
+                </a:solidFill>
+                <a:latin typeface="+mn-lt"/>
+                <a:ea typeface="+mn-ea"/>
+                <a:cs typeface="+mn-cs"/>
+              </a:defRPr>
+            </a:lvl5pPr>
+            <a:lvl6pPr marL="2285943" algn="l" defTabSz="914377" rtl="0" eaLnBrk="1" latinLnBrk="0" hangingPunct="1">
+              <a:defRPr sz="1800" kern="1200">
+                <a:solidFill>
+                  <a:schemeClr val="lt1"/>
+                </a:solidFill>
+                <a:latin typeface="+mn-lt"/>
+                <a:ea typeface="+mn-ea"/>
+                <a:cs typeface="+mn-cs"/>
+              </a:defRPr>
+            </a:lvl6pPr>
+            <a:lvl7pPr marL="2743131" algn="l" defTabSz="914377" rtl="0" eaLnBrk="1" latinLnBrk="0" hangingPunct="1">
+              <a:defRPr sz="1800" kern="1200">
+                <a:solidFill>
+                  <a:schemeClr val="lt1"/>
+                </a:solidFill>
+                <a:latin typeface="+mn-lt"/>
+                <a:ea typeface="+mn-ea"/>
+                <a:cs typeface="+mn-cs"/>
+              </a:defRPr>
+            </a:lvl7pPr>
+            <a:lvl8pPr marL="3200320" algn="l" defTabSz="914377" rtl="0" eaLnBrk="1" latinLnBrk="0" hangingPunct="1">
+              <a:defRPr sz="1800" kern="1200">
+                <a:solidFill>
+                  <a:schemeClr val="lt1"/>
+                </a:solidFill>
+                <a:latin typeface="+mn-lt"/>
+                <a:ea typeface="+mn-ea"/>
+                <a:cs typeface="+mn-cs"/>
+              </a:defRPr>
+            </a:lvl8pPr>
+            <a:lvl9pPr marL="3657509" algn="l" defTabSz="914377" rtl="0" eaLnBrk="1" latinLnBrk="0" hangingPunct="1">
+              <a:defRPr sz="1800" kern="1200">
+                <a:solidFill>
+                  <a:schemeClr val="lt1"/>
+                </a:solidFill>
+                <a:latin typeface="+mn-lt"/>
+                <a:ea typeface="+mn-ea"/>
+                <a:cs typeface="+mn-cs"/>
+              </a:defRPr>
+            </a:lvl9pPr>
+          </a:lstStyle>
+          <a:p>
+            <a:pPr algn="ctr"/>
+            <a:r>
+              <a:rPr lang="en-US" sz="1200" dirty="0" err="1">
+                <a:solidFill>
+                  <a:schemeClr val="bg1"/>
+                </a:solidFill>
+              </a:rPr>
+              <a:t>microui_constants.h</a:t>
+            </a:r>
+            <a:endParaRPr lang="en-US" sz="1200" dirty="0">
+              <a:solidFill>
+                <a:schemeClr val="bg1"/>
+              </a:solidFill>
+            </a:endParaRPr>
+          </a:p>
+        </p:txBody>
+      </p:sp>
     </p:spTree>
     <p:extLst>
       <p:ext uri="{BB962C8B-B14F-4D97-AF65-F5344CB8AC3E}">
@@ -7783,16 +7941,16 @@
           <a:p>
             <a:pPr algn="ctr"/>
             <a:r>
-              <a:rPr lang="en-US" sz="1050" dirty="0" err="1">
-                <a:solidFill>
-                  <a:schemeClr val="tx2"/>
+              <a:rPr lang="en-US" sz="1200" dirty="0" err="1">
+                <a:solidFill>
+                  <a:schemeClr val="bg1"/>
                 </a:solidFill>
               </a:rPr>
               <a:t>LLUIDisplayImpl</a:t>
             </a:r>
-            <a:endParaRPr lang="en-US" sz="1050" dirty="0">
+            <a:endParaRPr lang="en-US" sz="1200" dirty="0">
               <a:solidFill>
-                <a:schemeClr val="tx2"/>
+                <a:schemeClr val="bg1"/>
               </a:solidFill>
             </a:endParaRPr>
           </a:p>
@@ -8096,16 +8254,16 @@
           <a:p>
             <a:pPr algn="ctr"/>
             <a:r>
-              <a:rPr lang="en-US" sz="1050" dirty="0" err="1">
-                <a:solidFill>
-                  <a:schemeClr val="tx2"/>
+              <a:rPr lang="en-US" sz="1200" dirty="0" err="1">
+                <a:solidFill>
+                  <a:schemeClr val="bg1"/>
                 </a:solidFill>
               </a:rPr>
               <a:t>LLUIPainter</a:t>
             </a:r>
-            <a:endParaRPr lang="en-US" sz="1050" dirty="0">
+            <a:endParaRPr lang="en-US" sz="1200" dirty="0">
               <a:solidFill>
-                <a:schemeClr val="tx2"/>
+                <a:schemeClr val="bg1"/>
               </a:solidFill>
             </a:endParaRPr>
           </a:p>
@@ -8254,16 +8412,16 @@
           <a:p>
             <a:pPr algn="ctr"/>
             <a:r>
-              <a:rPr lang="en-US" sz="1050" dirty="0" err="1">
-                <a:solidFill>
-                  <a:schemeClr val="tx2"/>
+              <a:rPr lang="en-US" sz="1200" dirty="0" err="1">
+                <a:solidFill>
+                  <a:schemeClr val="bg1"/>
                 </a:solidFill>
               </a:rPr>
               <a:t>UIDrawing</a:t>
             </a:r>
-            <a:endParaRPr lang="en-US" sz="1050" dirty="0">
+            <a:endParaRPr lang="en-US" sz="1200" dirty="0">
               <a:solidFill>
-                <a:schemeClr val="tx2"/>
+                <a:schemeClr val="bg1"/>
               </a:solidFill>
             </a:endParaRPr>
           </a:p>
@@ -8412,16 +8570,16 @@
           <a:p>
             <a:pPr algn="ctr"/>
             <a:r>
-              <a:rPr lang="en-US" sz="1050" dirty="0" err="1">
-                <a:solidFill>
-                  <a:schemeClr val="tx2"/>
+              <a:rPr lang="en-US" sz="1100" dirty="0" err="1">
+                <a:solidFill>
+                  <a:schemeClr val="bg1"/>
                 </a:solidFill>
               </a:rPr>
               <a:t>UIDrawingDefault</a:t>
             </a:r>
-            <a:endParaRPr lang="en-US" sz="1050" dirty="0">
+            <a:endParaRPr lang="en-US" sz="1100" dirty="0">
               <a:solidFill>
-                <a:schemeClr val="tx2"/>
+                <a:schemeClr val="bg1"/>
               </a:solidFill>
             </a:endParaRPr>
           </a:p>
@@ -8606,9 +8764,9 @@
           <a:p>
             <a:pPr algn="ctr"/>
             <a:r>
-              <a:rPr lang="en-US" sz="1050" dirty="0">
-                <a:solidFill>
-                  <a:schemeClr val="tx2"/>
+              <a:rPr lang="en-US" sz="1200" dirty="0">
+                <a:solidFill>
+                  <a:schemeClr val="bg1"/>
                 </a:solidFill>
               </a:rPr>
               <a:t>Widgets (Display, LED etc.)</a:t>
@@ -8759,16 +8917,16 @@
           <a:p>
             <a:pPr algn="ctr"/>
             <a:r>
-              <a:rPr lang="en-US" sz="1050" dirty="0" err="1">
-                <a:solidFill>
-                  <a:schemeClr val="tx2"/>
+              <a:rPr lang="en-US" sz="1200" dirty="0" err="1">
+                <a:solidFill>
+                  <a:schemeClr val="bg1"/>
                 </a:solidFill>
               </a:rPr>
               <a:t>LLUIDisplay</a:t>
             </a:r>
-            <a:endParaRPr lang="en-US" sz="1050" dirty="0">
+            <a:endParaRPr lang="en-US" sz="1200" dirty="0">
               <a:solidFill>
-                <a:schemeClr val="tx2"/>
+                <a:schemeClr val="bg1"/>
               </a:solidFill>
             </a:endParaRPr>
           </a:p>
@@ -8917,16 +9075,16 @@
           <a:p>
             <a:pPr algn="ctr"/>
             <a:r>
-              <a:rPr lang="en-US" sz="1050" dirty="0" err="1">
-                <a:solidFill>
-                  <a:schemeClr val="tx2"/>
+              <a:rPr lang="en-US" sz="1200" dirty="0" err="1">
+                <a:solidFill>
+                  <a:schemeClr val="bg1"/>
                 </a:solidFill>
               </a:rPr>
               <a:t>LLUIInput</a:t>
             </a:r>
-            <a:endParaRPr lang="en-US" sz="1050" dirty="0">
+            <a:endParaRPr lang="en-US" sz="1200" dirty="0">
               <a:solidFill>
-                <a:schemeClr val="tx2"/>
+                <a:schemeClr val="bg1"/>
               </a:solidFill>
             </a:endParaRPr>
           </a:p>
@@ -9075,16 +9233,16 @@
           <a:p>
             <a:pPr algn="ctr"/>
             <a:r>
-              <a:rPr lang="en-US" sz="1050" dirty="0" err="1">
-                <a:solidFill>
-                  <a:schemeClr val="tx2"/>
+              <a:rPr lang="en-US" sz="1200" dirty="0" err="1">
+                <a:solidFill>
+                  <a:schemeClr val="bg1"/>
                 </a:solidFill>
               </a:rPr>
               <a:t>LLUILed_impl.h</a:t>
             </a:r>
-            <a:endParaRPr lang="en-US" sz="1050" dirty="0">
+            <a:endParaRPr lang="en-US" sz="1200" dirty="0">
               <a:solidFill>
-                <a:schemeClr val="tx2"/>
+                <a:schemeClr val="bg1"/>
               </a:solidFill>
             </a:endParaRPr>
           </a:p>
@@ -9388,16 +9546,16 @@
           <a:p>
             <a:pPr algn="ctr"/>
             <a:r>
-              <a:rPr lang="en-US" sz="1050" dirty="0" err="1">
-                <a:solidFill>
-                  <a:schemeClr val="tx2"/>
+              <a:rPr lang="en-US" sz="1200" dirty="0" err="1">
+                <a:solidFill>
+                  <a:schemeClr val="bg1"/>
                 </a:solidFill>
               </a:rPr>
               <a:t>LLDWPainter</a:t>
             </a:r>
-            <a:endParaRPr lang="en-US" sz="1050" dirty="0">
+            <a:endParaRPr lang="en-US" sz="1200" dirty="0">
               <a:solidFill>
-                <a:schemeClr val="tx2"/>
+                <a:schemeClr val="bg1"/>
               </a:solidFill>
             </a:endParaRPr>
           </a:p>
@@ -9636,25 +9794,25 @@
           <a:p>
             <a:pPr algn="ctr"/>
             <a:r>
-              <a:rPr lang="en-US" sz="1050" dirty="0">
-                <a:solidFill>
-                  <a:schemeClr val="tx2"/>
+              <a:rPr lang="en-US" sz="1200" dirty="0">
+                <a:solidFill>
+                  <a:schemeClr val="bg1"/>
                 </a:solidFill>
               </a:rPr>
               <a:t>.</a:t>
             </a:r>
             <a:r>
-              <a:rPr lang="en-US" sz="1050" dirty="0" err="1">
-                <a:solidFill>
-                  <a:schemeClr val="tx2"/>
+              <a:rPr lang="en-US" sz="1200" dirty="0" err="1">
+                <a:solidFill>
+                  <a:schemeClr val="bg1"/>
                 </a:solidFill>
               </a:rPr>
               <a:t>fp</a:t>
             </a:r>
             <a:r>
-              <a:rPr lang="en-US" sz="1050" dirty="0">
-                <a:solidFill>
-                  <a:schemeClr val="tx2"/>
+              <a:rPr lang="en-US" sz="1200" dirty="0">
+                <a:solidFill>
+                  <a:schemeClr val="bg1"/>
                 </a:solidFill>
               </a:rPr>
               <a:t> file and resources</a:t>
@@ -9805,9 +9963,9 @@
           <a:p>
             <a:pPr algn="ctr"/>
             <a:r>
-              <a:rPr lang="en-US" sz="1050" dirty="0">
-                <a:solidFill>
-                  <a:schemeClr val="tx2"/>
+              <a:rPr lang="en-US" sz="1200" dirty="0">
+                <a:solidFill>
+                  <a:schemeClr val="bg1"/>
                 </a:solidFill>
               </a:rPr>
               <a:t>Widgets</a:t>
@@ -9960,7 +10118,7 @@
             <a:r>
               <a:rPr lang="en-US" sz="1050" dirty="0">
                 <a:solidFill>
-                  <a:schemeClr val="tx2"/>
+                  <a:schemeClr val="bg1"/>
                 </a:solidFill>
               </a:rPr>
               <a:t>Extended native drawings</a:t>
@@ -10111,16 +10269,16 @@
           <a:p>
             <a:pPr algn="ctr"/>
             <a:r>
-              <a:rPr lang="en-US" sz="1050" dirty="0" err="1">
-                <a:solidFill>
-                  <a:schemeClr val="tx2"/>
+              <a:rPr lang="en-US" sz="1200" dirty="0" err="1">
+                <a:solidFill>
+                  <a:schemeClr val="bg1"/>
                 </a:solidFill>
               </a:rPr>
               <a:t>DWDrawing</a:t>
             </a:r>
-            <a:endParaRPr lang="en-US" sz="1050" dirty="0">
+            <a:endParaRPr lang="en-US" sz="1200" dirty="0">
               <a:solidFill>
-                <a:schemeClr val="tx2"/>
+                <a:schemeClr val="bg1"/>
               </a:solidFill>
             </a:endParaRPr>
           </a:p>
@@ -10271,14 +10429,14 @@
             <a:r>
               <a:rPr lang="en-US" sz="1050" dirty="0" err="1">
                 <a:solidFill>
-                  <a:schemeClr val="tx2"/>
+                  <a:schemeClr val="bg1"/>
                 </a:solidFill>
               </a:rPr>
               <a:t>DWDrawingDefault</a:t>
             </a:r>
             <a:endParaRPr lang="en-US" sz="1050" dirty="0">
               <a:solidFill>
-                <a:schemeClr val="tx2"/>
+                <a:schemeClr val="bg1"/>
               </a:solidFill>
             </a:endParaRPr>
           </a:p>
@@ -11172,14 +11330,14 @@
             <a:r>
               <a:rPr lang="en-US" sz="1200" dirty="0" err="1">
                 <a:solidFill>
-                  <a:schemeClr val="tx2"/>
+                  <a:schemeClr val="bg1"/>
                 </a:solidFill>
               </a:rPr>
               <a:t>LLUI_LED_impl.h</a:t>
             </a:r>
             <a:endParaRPr lang="en-US" sz="1200" dirty="0">
               <a:solidFill>
-                <a:schemeClr val="tx2"/>
+                <a:schemeClr val="bg1"/>
               </a:solidFill>
             </a:endParaRPr>
           </a:p>
@@ -11330,14 +11488,14 @@
             <a:r>
               <a:rPr lang="en-US" sz="1200" dirty="0" err="1">
                 <a:solidFill>
-                  <a:schemeClr val="tx2"/>
+                  <a:schemeClr val="bg1"/>
                 </a:solidFill>
               </a:rPr>
               <a:t>LLUI_LED_impl.c</a:t>
             </a:r>
             <a:endParaRPr lang="en-US" sz="1200" dirty="0">
               <a:solidFill>
-                <a:schemeClr val="tx2"/>
+                <a:schemeClr val="bg1"/>
               </a:solidFill>
             </a:endParaRPr>
           </a:p>
@@ -12503,14 +12661,14 @@
             <a:r>
               <a:rPr lang="en-US" sz="1200" dirty="0" err="1">
                 <a:solidFill>
-                  <a:schemeClr val="tx2"/>
+                  <a:schemeClr val="bg1"/>
                 </a:solidFill>
               </a:rPr>
               <a:t>LLUI_LED_impl.h</a:t>
             </a:r>
             <a:endParaRPr lang="en-US" sz="1200" dirty="0">
               <a:solidFill>
-                <a:schemeClr val="tx2"/>
+                <a:schemeClr val="bg1"/>
               </a:solidFill>
             </a:endParaRPr>
           </a:p>
@@ -12661,14 +12819,14 @@
             <a:r>
               <a:rPr lang="en-US" sz="1200" dirty="0" err="1">
                 <a:solidFill>
-                  <a:schemeClr val="tx2"/>
+                  <a:schemeClr val="bg1"/>
                 </a:solidFill>
               </a:rPr>
               <a:t>LLUI_LED_impl.c</a:t>
             </a:r>
             <a:endParaRPr lang="en-US" sz="1200" dirty="0">
               <a:solidFill>
-                <a:schemeClr val="tx2"/>
+                <a:schemeClr val="bg1"/>
               </a:solidFill>
             </a:endParaRPr>
           </a:p>
@@ -13554,14 +13712,14 @@
             <a:r>
               <a:rPr lang="en-US" sz="1200" dirty="0" err="1">
                 <a:solidFill>
-                  <a:schemeClr val="tx2"/>
+                  <a:schemeClr val="bg1"/>
                 </a:solidFill>
               </a:rPr>
               <a:t>LLUI_INPUT_impl.h</a:t>
             </a:r>
             <a:endParaRPr lang="en-US" sz="1200" dirty="0">
               <a:solidFill>
-                <a:schemeClr val="tx2"/>
+                <a:schemeClr val="bg1"/>
               </a:solidFill>
             </a:endParaRPr>
           </a:p>
@@ -13712,14 +13870,14 @@
             <a:r>
               <a:rPr lang="en-US" sz="1200" dirty="0" err="1">
                 <a:solidFill>
-                  <a:schemeClr val="tx2"/>
+                  <a:schemeClr val="bg1"/>
                 </a:solidFill>
               </a:rPr>
               <a:t>LLUI_INPUT.h</a:t>
             </a:r>
             <a:endParaRPr lang="en-US" sz="1200" dirty="0">
               <a:solidFill>
-                <a:schemeClr val="tx2"/>
+                <a:schemeClr val="bg1"/>
               </a:solidFill>
             </a:endParaRPr>
           </a:p>
@@ -13925,14 +14083,14 @@
             <a:r>
               <a:rPr lang="en-US" sz="1200" dirty="0" err="1">
                 <a:solidFill>
-                  <a:schemeClr val="tx2"/>
+                  <a:schemeClr val="bg1"/>
                 </a:solidFill>
               </a:rPr>
               <a:t>LLUI_INPUT_impl.c</a:t>
             </a:r>
             <a:endParaRPr lang="en-US" sz="1200" dirty="0">
               <a:solidFill>
-                <a:schemeClr val="tx2"/>
+                <a:schemeClr val="bg1"/>
               </a:solidFill>
             </a:endParaRPr>
           </a:p>
@@ -14625,14 +14783,14 @@
             <a:r>
               <a:rPr lang="en-US" sz="1200" dirty="0" err="1">
                 <a:solidFill>
-                  <a:schemeClr val="tx2"/>
+                  <a:schemeClr val="bg1"/>
                 </a:solidFill>
               </a:rPr>
               <a:t>LLUI_INPUT_impl.c</a:t>
             </a:r>
             <a:endParaRPr lang="en-US" sz="1200" dirty="0">
               <a:solidFill>
-                <a:schemeClr val="tx2"/>
+                <a:schemeClr val="bg1"/>
               </a:solidFill>
             </a:endParaRPr>
           </a:p>
@@ -14783,14 +14941,14 @@
             <a:r>
               <a:rPr lang="en-US" sz="1200" dirty="0" err="1">
                 <a:solidFill>
-                  <a:schemeClr val="tx2"/>
+                  <a:schemeClr val="bg1"/>
                 </a:solidFill>
               </a:rPr>
               <a:t>LLUI_INPUT_impl.h</a:t>
             </a:r>
             <a:endParaRPr lang="en-US" sz="1200" dirty="0">
               <a:solidFill>
-                <a:schemeClr val="tx2"/>
+                <a:schemeClr val="bg1"/>
               </a:solidFill>
             </a:endParaRPr>
           </a:p>
@@ -15263,14 +15421,14 @@
             <a:r>
               <a:rPr lang="en-US" sz="1200" dirty="0" err="1">
                 <a:solidFill>
-                  <a:schemeClr val="tx2"/>
+                  <a:schemeClr val="bg1"/>
                 </a:solidFill>
               </a:rPr>
               <a:t>driver.c</a:t>
             </a:r>
             <a:endParaRPr lang="en-US" sz="1200" dirty="0">
               <a:solidFill>
-                <a:schemeClr val="tx2"/>
+                <a:schemeClr val="bg1"/>
               </a:solidFill>
             </a:endParaRPr>
           </a:p>
@@ -15671,14 +15829,14 @@
             <a:r>
               <a:rPr lang="en-US" sz="1200" dirty="0" err="1">
                 <a:solidFill>
-                  <a:schemeClr val="tx2"/>
+                  <a:schemeClr val="bg1"/>
                 </a:solidFill>
               </a:rPr>
               <a:t>LLUI_INPUT.h</a:t>
             </a:r>
             <a:endParaRPr lang="en-US" sz="1200" dirty="0">
               <a:solidFill>
-                <a:schemeClr val="tx2"/>
+                <a:schemeClr val="bg1"/>
               </a:solidFill>
             </a:endParaRPr>
           </a:p>
@@ -16073,14 +16231,14 @@
             <a:r>
               <a:rPr lang="en-US" sz="1200" dirty="0" err="1">
                 <a:solidFill>
-                  <a:schemeClr val="tx2"/>
+                  <a:schemeClr val="bg1"/>
                 </a:solidFill>
               </a:rPr>
               <a:t>LLUI_INPUT.h</a:t>
             </a:r>
             <a:endParaRPr lang="en-US" sz="1200" dirty="0">
               <a:solidFill>
-                <a:schemeClr val="tx2"/>
+                <a:schemeClr val="bg1"/>
               </a:solidFill>
             </a:endParaRPr>
           </a:p>
@@ -16762,16 +16920,16 @@
           <a:p>
             <a:pPr algn="ctr"/>
             <a:r>
-              <a:rPr lang="en-US" sz="1050" dirty="0" err="1">
-                <a:solidFill>
-                  <a:schemeClr val="tx2"/>
+              <a:rPr lang="en-US" sz="1100" dirty="0" err="1">
+                <a:solidFill>
+                  <a:schemeClr val="bg1"/>
                 </a:solidFill>
               </a:rPr>
               <a:t>LLUI_DISPLAY_impl.h</a:t>
             </a:r>
-            <a:endParaRPr lang="en-US" sz="1050" dirty="0">
+            <a:endParaRPr lang="en-US" sz="1100" dirty="0">
               <a:solidFill>
-                <a:schemeClr val="tx2"/>
+                <a:schemeClr val="bg1"/>
               </a:solidFill>
             </a:endParaRPr>
           </a:p>
@@ -17075,16 +17233,16 @@
           <a:p>
             <a:pPr algn="ctr"/>
             <a:r>
-              <a:rPr lang="en-US" sz="1050" dirty="0" err="1">
-                <a:solidFill>
-                  <a:schemeClr val="tx2"/>
+              <a:rPr lang="en-US" sz="1100" dirty="0" err="1">
+                <a:solidFill>
+                  <a:schemeClr val="bg1"/>
                 </a:solidFill>
               </a:rPr>
               <a:t>LLUI_PAINTER_impl.h</a:t>
             </a:r>
-            <a:endParaRPr lang="en-US" sz="1050" dirty="0">
+            <a:endParaRPr lang="en-US" sz="1100" dirty="0">
               <a:solidFill>
-                <a:schemeClr val="tx2"/>
+                <a:schemeClr val="bg1"/>
               </a:solidFill>
             </a:endParaRPr>
           </a:p>
@@ -17233,16 +17391,16 @@
           <a:p>
             <a:pPr algn="ctr"/>
             <a:r>
-              <a:rPr lang="en-US" sz="1050" dirty="0" err="1">
-                <a:solidFill>
-                  <a:schemeClr val="tx2"/>
+              <a:rPr lang="en-US" sz="1200" dirty="0" err="1">
+                <a:solidFill>
+                  <a:schemeClr val="bg1"/>
                 </a:solidFill>
               </a:rPr>
               <a:t>ui_drawing.h</a:t>
             </a:r>
-            <a:endParaRPr lang="en-US" sz="1050" dirty="0">
+            <a:endParaRPr lang="en-US" sz="1200" dirty="0">
               <a:solidFill>
-                <a:schemeClr val="tx2"/>
+                <a:schemeClr val="bg1"/>
               </a:solidFill>
             </a:endParaRPr>
           </a:p>
@@ -17391,16 +17549,16 @@
           <a:p>
             <a:pPr algn="ctr"/>
             <a:r>
-              <a:rPr lang="en-US" sz="1050" dirty="0" err="1">
-                <a:solidFill>
-                  <a:schemeClr val="tx2"/>
+              <a:rPr lang="en-US" sz="1200" dirty="0" err="1">
+                <a:solidFill>
+                  <a:schemeClr val="bg1"/>
                 </a:solidFill>
               </a:rPr>
               <a:t>ui_drawing_soft.h</a:t>
             </a:r>
-            <a:endParaRPr lang="en-US" sz="1050" dirty="0">
+            <a:endParaRPr lang="en-US" sz="1200" dirty="0">
               <a:solidFill>
-                <a:schemeClr val="tx2"/>
+                <a:schemeClr val="bg1"/>
               </a:solidFill>
             </a:endParaRPr>
           </a:p>
@@ -17549,16 +17707,16 @@
           <a:p>
             <a:pPr algn="ctr"/>
             <a:r>
-              <a:rPr lang="en-US" sz="1050" dirty="0" err="1">
-                <a:solidFill>
-                  <a:schemeClr val="tx2"/>
+              <a:rPr lang="en-US" sz="1100" dirty="0" err="1">
+                <a:solidFill>
+                  <a:schemeClr val="bg1"/>
                 </a:solidFill>
               </a:rPr>
               <a:t>LLUI_PAINTER_impl.c</a:t>
             </a:r>
-            <a:endParaRPr lang="en-US" sz="1050" dirty="0">
+            <a:endParaRPr lang="en-US" sz="1100" dirty="0">
               <a:solidFill>
-                <a:schemeClr val="tx2"/>
+                <a:schemeClr val="bg1"/>
               </a:solidFill>
             </a:endParaRPr>
           </a:p>
@@ -17707,16 +17865,16 @@
           <a:p>
             <a:pPr algn="ctr"/>
             <a:r>
-              <a:rPr lang="en-US" sz="1050" dirty="0" err="1">
-                <a:solidFill>
-                  <a:schemeClr val="tx2"/>
+              <a:rPr lang="en-US" sz="1200" dirty="0" err="1">
+                <a:solidFill>
+                  <a:schemeClr val="bg1"/>
                 </a:solidFill>
               </a:rPr>
               <a:t>LLUI_DISPLAY.h</a:t>
             </a:r>
-            <a:endParaRPr lang="en-US" sz="1050" dirty="0">
+            <a:endParaRPr lang="en-US" sz="1200" dirty="0">
               <a:solidFill>
-                <a:schemeClr val="tx2"/>
+                <a:schemeClr val="bg1"/>
               </a:solidFill>
             </a:endParaRPr>
           </a:p>
@@ -17865,16 +18023,16 @@
           <a:p>
             <a:pPr algn="ctr"/>
             <a:r>
-              <a:rPr lang="en-US" sz="1050" dirty="0" err="1">
-                <a:solidFill>
-                  <a:schemeClr val="tx2"/>
+              <a:rPr lang="en-US" sz="1100" dirty="0" err="1">
+                <a:solidFill>
+                  <a:schemeClr val="bg1"/>
                 </a:solidFill>
               </a:rPr>
               <a:t>LLDW_PAINTER_impl.c</a:t>
             </a:r>
-            <a:endParaRPr lang="en-US" sz="1050" dirty="0">
+            <a:endParaRPr lang="en-US" sz="1100" dirty="0">
               <a:solidFill>
-                <a:schemeClr val="tx2"/>
+                <a:schemeClr val="bg1"/>
               </a:solidFill>
             </a:endParaRPr>
           </a:p>
@@ -18178,16 +18336,16 @@
           <a:p>
             <a:pPr algn="ctr"/>
             <a:r>
-              <a:rPr lang="en-US" sz="1050" dirty="0" err="1">
-                <a:solidFill>
-                  <a:schemeClr val="tx2"/>
+              <a:rPr lang="en-US" sz="1100" dirty="0" err="1">
+                <a:solidFill>
+                  <a:schemeClr val="bg1"/>
                 </a:solidFill>
               </a:rPr>
               <a:t>LLDW_PAINTER_impl.h</a:t>
             </a:r>
-            <a:endParaRPr lang="en-US" sz="1050" dirty="0">
+            <a:endParaRPr lang="en-US" sz="1100" dirty="0">
               <a:solidFill>
-                <a:schemeClr val="tx2"/>
+                <a:schemeClr val="bg1"/>
               </a:solidFill>
             </a:endParaRPr>
           </a:p>
@@ -18371,16 +18529,16 @@
           <a:p>
             <a:pPr algn="ctr"/>
             <a:r>
-              <a:rPr lang="en-US" sz="1050" dirty="0" err="1">
-                <a:solidFill>
-                  <a:schemeClr val="tx2"/>
+              <a:rPr lang="en-US" sz="1200" dirty="0" err="1">
+                <a:solidFill>
+                  <a:schemeClr val="bg1"/>
                 </a:solidFill>
               </a:rPr>
               <a:t>LLUI_DISPLAY_impl.c</a:t>
             </a:r>
-            <a:endParaRPr lang="en-US" sz="1050" dirty="0">
+            <a:endParaRPr lang="en-US" sz="1200" dirty="0">
               <a:solidFill>
-                <a:schemeClr val="tx2"/>
+                <a:schemeClr val="bg1"/>
               </a:solidFill>
             </a:endParaRPr>
           </a:p>
@@ -18529,16 +18687,16 @@
           <a:p>
             <a:pPr algn="ctr"/>
             <a:r>
-              <a:rPr lang="en-US" sz="1050" dirty="0" err="1">
-                <a:solidFill>
-                  <a:schemeClr val="tx2"/>
+              <a:rPr lang="en-US" sz="1200" dirty="0" err="1">
+                <a:solidFill>
+                  <a:schemeClr val="bg1"/>
                 </a:solidFill>
               </a:rPr>
               <a:t>dw_drawing.h</a:t>
             </a:r>
-            <a:endParaRPr lang="en-US" sz="1050" dirty="0">
+            <a:endParaRPr lang="en-US" sz="1200" dirty="0">
               <a:solidFill>
-                <a:schemeClr val="tx2"/>
+                <a:schemeClr val="bg1"/>
               </a:solidFill>
             </a:endParaRPr>
           </a:p>
@@ -18687,16 +18845,16 @@
           <a:p>
             <a:pPr algn="ctr"/>
             <a:r>
-              <a:rPr lang="en-US" sz="1050" dirty="0" err="1">
-                <a:solidFill>
-                  <a:schemeClr val="tx2"/>
+              <a:rPr lang="en-US" sz="1200" dirty="0" err="1">
+                <a:solidFill>
+                  <a:schemeClr val="bg1"/>
                 </a:solidFill>
               </a:rPr>
               <a:t>dw_drawing_soft.h</a:t>
             </a:r>
-            <a:endParaRPr lang="en-US" sz="1050" dirty="0">
+            <a:endParaRPr lang="en-US" sz="1200" dirty="0">
               <a:solidFill>
-                <a:schemeClr val="tx2"/>
+                <a:schemeClr val="bg1"/>
               </a:solidFill>
             </a:endParaRPr>
           </a:p>
@@ -19301,9 +19459,9 @@
           <p:nvPr/>
         </p:nvCxnSpPr>
         <p:spPr>
-          <a:xfrm flipV="1">
-            <a:off x="772331" y="2161575"/>
-            <a:ext cx="36402" cy="2244665"/>
+          <a:xfrm flipH="1" flipV="1">
+            <a:off x="808733" y="2161576"/>
+            <a:ext cx="1142" cy="2221237"/>
           </a:xfrm>
           <a:prstGeom prst="line">
             <a:avLst/>
@@ -19476,8 +19634,8 @@
         </p:nvCxnSpPr>
         <p:spPr>
           <a:xfrm flipV="1">
-            <a:off x="1847289" y="2165206"/>
-            <a:ext cx="36402" cy="2237401"/>
+            <a:off x="2183111" y="2161574"/>
+            <a:ext cx="4877" cy="2233948"/>
           </a:xfrm>
           <a:prstGeom prst="line">
             <a:avLst/>
@@ -19513,8 +19671,8 @@
         </p:nvCxnSpPr>
         <p:spPr>
           <a:xfrm flipV="1">
-            <a:off x="1425986" y="900154"/>
-            <a:ext cx="31872" cy="951329"/>
+            <a:off x="1425986" y="889478"/>
+            <a:ext cx="0" cy="962006"/>
           </a:xfrm>
           <a:prstGeom prst="line">
             <a:avLst/>
@@ -20019,14 +20177,14 @@
             <a:r>
               <a:rPr lang="en-US" sz="1200" dirty="0" err="1">
                 <a:solidFill>
-                  <a:schemeClr val="tx2"/>
+                  <a:schemeClr val="bg1"/>
                 </a:solidFill>
               </a:rPr>
               <a:t>LLUI_DISPLAY_impl.h</a:t>
             </a:r>
             <a:endParaRPr lang="en-US" sz="1200" dirty="0">
               <a:solidFill>
-                <a:schemeClr val="tx2"/>
+                <a:schemeClr val="bg1"/>
               </a:solidFill>
             </a:endParaRPr>
           </a:p>
@@ -20332,14 +20490,14 @@
             <a:r>
               <a:rPr lang="en-US" sz="1200" dirty="0" err="1">
                 <a:solidFill>
-                  <a:schemeClr val="tx2"/>
+                  <a:schemeClr val="bg1"/>
                 </a:solidFill>
               </a:rPr>
               <a:t>LLUI_PAINTER_impl.h</a:t>
             </a:r>
             <a:endParaRPr lang="en-US" sz="1200" dirty="0">
               <a:solidFill>
-                <a:schemeClr val="tx2"/>
+                <a:schemeClr val="bg1"/>
               </a:solidFill>
             </a:endParaRPr>
           </a:p>
@@ -20490,14 +20648,14 @@
             <a:r>
               <a:rPr lang="en-US" sz="1200" dirty="0" err="1">
                 <a:solidFill>
-                  <a:schemeClr val="tx2"/>
+                  <a:schemeClr val="bg1"/>
                 </a:solidFill>
               </a:rPr>
               <a:t>ui_drawing.h</a:t>
             </a:r>
             <a:endParaRPr lang="en-US" sz="1200" dirty="0">
               <a:solidFill>
-                <a:schemeClr val="tx2"/>
+                <a:schemeClr val="bg1"/>
               </a:solidFill>
             </a:endParaRPr>
           </a:p>
@@ -20646,16 +20804,16 @@
           <a:p>
             <a:pPr algn="ctr"/>
             <a:r>
-              <a:rPr lang="en-US" sz="1050" dirty="0" err="1">
-                <a:solidFill>
-                  <a:schemeClr val="tx2"/>
+              <a:rPr lang="en-US" sz="1100" dirty="0" err="1">
+                <a:solidFill>
+                  <a:schemeClr val="bg1"/>
                 </a:solidFill>
               </a:rPr>
               <a:t>ui_drawing_soft.h</a:t>
             </a:r>
-            <a:endParaRPr lang="en-US" sz="1050" dirty="0">
+            <a:endParaRPr lang="en-US" sz="1100" dirty="0">
               <a:solidFill>
-                <a:schemeClr val="tx2"/>
+                <a:schemeClr val="bg1"/>
               </a:solidFill>
             </a:endParaRPr>
           </a:p>
@@ -20846,14 +21004,14 @@
             <a:r>
               <a:rPr lang="en-US" sz="1200" dirty="0" err="1">
                 <a:solidFill>
-                  <a:schemeClr val="tx2"/>
+                  <a:schemeClr val="bg1"/>
                 </a:solidFill>
               </a:rPr>
               <a:t>LLUI_PAINTER_impl.c</a:t>
             </a:r>
             <a:endParaRPr lang="en-US" sz="1200" dirty="0">
               <a:solidFill>
-                <a:schemeClr val="tx2"/>
+                <a:schemeClr val="bg1"/>
               </a:solidFill>
             </a:endParaRPr>
           </a:p>
@@ -21004,14 +21162,14 @@
             <a:r>
               <a:rPr lang="en-US" sz="1200" dirty="0" err="1">
                 <a:solidFill>
-                  <a:schemeClr val="tx2"/>
+                  <a:schemeClr val="bg1"/>
                 </a:solidFill>
               </a:rPr>
               <a:t>LLUI_DISPLAY.h</a:t>
             </a:r>
             <a:endParaRPr lang="en-US" sz="1200" dirty="0">
               <a:solidFill>
-                <a:schemeClr val="tx2"/>
+                <a:schemeClr val="bg1"/>
               </a:solidFill>
             </a:endParaRPr>
           </a:p>
@@ -21162,14 +21320,14 @@
             <a:r>
               <a:rPr lang="en-US" sz="1200" dirty="0" err="1">
                 <a:solidFill>
-                  <a:schemeClr val="tx2"/>
+                  <a:schemeClr val="bg1"/>
                 </a:solidFill>
               </a:rPr>
               <a:t>LLDW_PAINTER_impl.c</a:t>
             </a:r>
             <a:endParaRPr lang="en-US" sz="1200" dirty="0">
               <a:solidFill>
-                <a:schemeClr val="tx2"/>
+                <a:schemeClr val="bg1"/>
               </a:solidFill>
             </a:endParaRPr>
           </a:p>
@@ -21475,14 +21633,14 @@
             <a:r>
               <a:rPr lang="en-US" sz="1200" dirty="0" err="1">
                 <a:solidFill>
-                  <a:schemeClr val="tx2"/>
+                  <a:schemeClr val="bg1"/>
                 </a:solidFill>
               </a:rPr>
               <a:t>LLDW_PAINTER_impl.h</a:t>
             </a:r>
             <a:endParaRPr lang="en-US" sz="1200" dirty="0">
               <a:solidFill>
-                <a:schemeClr val="tx2"/>
+                <a:schemeClr val="bg1"/>
               </a:solidFill>
             </a:endParaRPr>
           </a:p>
@@ -21668,14 +21826,14 @@
             <a:r>
               <a:rPr lang="en-US" sz="1200" dirty="0" err="1">
                 <a:solidFill>
-                  <a:schemeClr val="tx2"/>
+                  <a:schemeClr val="bg1"/>
                 </a:solidFill>
               </a:rPr>
               <a:t>LLUI_DISPLAY_impl.c</a:t>
             </a:r>
             <a:endParaRPr lang="en-US" sz="1200" dirty="0">
               <a:solidFill>
-                <a:schemeClr val="tx2"/>
+                <a:schemeClr val="bg1"/>
               </a:solidFill>
             </a:endParaRPr>
           </a:p>
@@ -21826,14 +21984,14 @@
             <a:r>
               <a:rPr lang="en-US" sz="1200" dirty="0" err="1">
                 <a:solidFill>
-                  <a:schemeClr val="tx2"/>
+                  <a:schemeClr val="bg1"/>
                 </a:solidFill>
               </a:rPr>
               <a:t>dw_drawing.h</a:t>
             </a:r>
             <a:endParaRPr lang="en-US" sz="1200" dirty="0">
               <a:solidFill>
-                <a:schemeClr val="tx2"/>
+                <a:schemeClr val="bg1"/>
               </a:solidFill>
             </a:endParaRPr>
           </a:p>
@@ -21984,14 +22142,14 @@
             <a:r>
               <a:rPr lang="en-US" sz="1050" dirty="0" err="1">
                 <a:solidFill>
-                  <a:schemeClr val="tx2"/>
+                  <a:schemeClr val="bg1"/>
                 </a:solidFill>
               </a:rPr>
               <a:t>dw_drawing_soft.h</a:t>
             </a:r>
             <a:endParaRPr lang="en-US" sz="1050" dirty="0">
               <a:solidFill>
-                <a:schemeClr val="tx2"/>
+                <a:schemeClr val="bg1"/>
               </a:solidFill>
             </a:endParaRPr>
           </a:p>

</xml_diff>